<commit_message>
Update Protractor.pptx, inContact.pptx, and ~$Protractor.pptx
</commit_message>
<xml_diff>
--- a/Document/Study_document/Protractor.pptx
+++ b/Document/Study_document/Protractor.pptx
@@ -135,7 +135,7 @@
   </p:defaultTextStyle>
   <p:extLst>
     <p:ext uri="{EFAFB233-063F-42B5-8137-9DF3F51BA10A}">
-      <p15:sldGuideLst xmlns="" xmlns:p15="http://schemas.microsoft.com/office/powerpoint/2012/main">
+      <p15:sldGuideLst xmlns:p15="http://schemas.microsoft.com/office/powerpoint/2012/main">
         <p15:guide id="1" orient="horz" pos="2160">
           <p15:clr>
             <a:srgbClr val="A4A3A4"/>
@@ -242,7 +242,7 @@
           <a:p>
             <a:fld id="{7DBC1745-093B-4D3D-9A89-9CD99C9E4F7D}" type="datetimeFigureOut">
               <a:rPr lang="en-US" smtClean="0"/>
-              <a:t>10/15/2020</a:t>
+              <a:t>2/22/2021</a:t>
             </a:fld>
             <a:endParaRPr lang="en-US"/>
           </a:p>
@@ -1185,7 +1185,7 @@
           <a:p>
             <a:fld id="{AF88043E-905E-4148-B009-B3CB700EBBEA}" type="datetimeFigureOut">
               <a:rPr lang="en-US" smtClean="0"/>
-              <a:t>10/15/2020</a:t>
+              <a:t>2/22/2021</a:t>
             </a:fld>
             <a:endParaRPr lang="en-US"/>
           </a:p>
@@ -1571,7 +1571,7 @@
           <a:p>
             <a:fld id="{AF88043E-905E-4148-B009-B3CB700EBBEA}" type="datetimeFigureOut">
               <a:rPr lang="en-US" smtClean="0"/>
-              <a:t>10/15/2020</a:t>
+              <a:t>2/22/2021</a:t>
             </a:fld>
             <a:endParaRPr lang="en-US"/>
           </a:p>
@@ -1720,7 +1720,7 @@
           <a:p>
             <a:fld id="{AF88043E-905E-4148-B009-B3CB700EBBEA}" type="datetimeFigureOut">
               <a:rPr lang="en-US" smtClean="0"/>
-              <a:t>10/15/2020</a:t>
+              <a:t>2/22/2021</a:t>
             </a:fld>
             <a:endParaRPr lang="en-US"/>
           </a:p>
@@ -2361,7 +2361,7 @@
           <a:p>
             <a:fld id="{AF88043E-905E-4148-B009-B3CB700EBBEA}" type="datetimeFigureOut">
               <a:rPr lang="en-US" smtClean="0"/>
-              <a:t>10/15/2020</a:t>
+              <a:t>2/22/2021</a:t>
             </a:fld>
             <a:endParaRPr lang="en-US"/>
           </a:p>
@@ -3212,7 +3212,7 @@
           <a:p>
             <a:fld id="{AF88043E-905E-4148-B009-B3CB700EBBEA}" type="datetimeFigureOut">
               <a:rPr lang="en-US" smtClean="0"/>
-              <a:t>10/15/2020</a:t>
+              <a:t>2/22/2021</a:t>
             </a:fld>
             <a:endParaRPr lang="en-US"/>
           </a:p>
@@ -3391,7 +3391,7 @@
           <a:p>
             <a:fld id="{AF88043E-905E-4148-B009-B3CB700EBBEA}" type="datetimeFigureOut">
               <a:rPr lang="en-US" smtClean="0"/>
-              <a:t>10/15/2020</a:t>
+              <a:t>2/22/2021</a:t>
             </a:fld>
             <a:endParaRPr lang="en-US"/>
           </a:p>
@@ -4860,14 +4860,14 @@
                 <a:gridCol w="824770">
                   <a:extLst>
                     <a:ext uri="{9D8B030D-6E8A-4147-A177-3AD203B41FA5}">
-                      <a16:colId xmlns="" xmlns:a16="http://schemas.microsoft.com/office/drawing/2014/main" val="20000"/>
+                      <a16:colId xmlns:a16="http://schemas.microsoft.com/office/drawing/2014/main" xmlns="" val="20000"/>
                     </a:ext>
                   </a:extLst>
                 </a:gridCol>
                 <a:gridCol w="8770168">
                   <a:extLst>
                     <a:ext uri="{9D8B030D-6E8A-4147-A177-3AD203B41FA5}">
-                      <a16:colId xmlns="" xmlns:a16="http://schemas.microsoft.com/office/drawing/2014/main" val="20001"/>
+                      <a16:colId xmlns:a16="http://schemas.microsoft.com/office/drawing/2014/main" xmlns="" val="20001"/>
                     </a:ext>
                   </a:extLst>
                 </a:gridCol>
@@ -5072,7 +5072,7 @@
                 </a:tc>
                 <a:extLst>
                   <a:ext uri="{0D108BD9-81ED-4DB2-BD59-A6C34878D82A}">
-                    <a16:rowId xmlns="" xmlns:a16="http://schemas.microsoft.com/office/drawing/2014/main" val="10000"/>
+                    <a16:rowId xmlns:a16="http://schemas.microsoft.com/office/drawing/2014/main" xmlns="" val="10000"/>
                   </a:ext>
                 </a:extLst>
               </a:tr>
@@ -5300,7 +5300,7 @@
                 </a:tc>
                 <a:extLst>
                   <a:ext uri="{0D108BD9-81ED-4DB2-BD59-A6C34878D82A}">
-                    <a16:rowId xmlns="" xmlns:a16="http://schemas.microsoft.com/office/drawing/2014/main" val="10001"/>
+                    <a16:rowId xmlns:a16="http://schemas.microsoft.com/office/drawing/2014/main" xmlns="" val="10001"/>
                   </a:ext>
                 </a:extLst>
               </a:tr>
@@ -5500,7 +5500,7 @@
                 </a:tc>
                 <a:extLst>
                   <a:ext uri="{0D108BD9-81ED-4DB2-BD59-A6C34878D82A}">
-                    <a16:rowId xmlns="" xmlns:a16="http://schemas.microsoft.com/office/drawing/2014/main" val="10002"/>
+                    <a16:rowId xmlns:a16="http://schemas.microsoft.com/office/drawing/2014/main" xmlns="" val="10002"/>
                   </a:ext>
                 </a:extLst>
               </a:tr>
@@ -5692,7 +5692,7 @@
                 </a:tc>
                 <a:extLst>
                   <a:ext uri="{0D108BD9-81ED-4DB2-BD59-A6C34878D82A}">
-                    <a16:rowId xmlns="" xmlns:a16="http://schemas.microsoft.com/office/drawing/2014/main" val="10003"/>
+                    <a16:rowId xmlns:a16="http://schemas.microsoft.com/office/drawing/2014/main" xmlns="" val="10003"/>
                   </a:ext>
                 </a:extLst>
               </a:tr>
@@ -5919,14 +5919,14 @@
                 <a:gridCol w="824770">
                   <a:extLst>
                     <a:ext uri="{9D8B030D-6E8A-4147-A177-3AD203B41FA5}">
-                      <a16:colId xmlns="" xmlns:a16="http://schemas.microsoft.com/office/drawing/2014/main" val="20000"/>
+                      <a16:colId xmlns:a16="http://schemas.microsoft.com/office/drawing/2014/main" xmlns="" val="20000"/>
                     </a:ext>
                   </a:extLst>
                 </a:gridCol>
                 <a:gridCol w="8770168">
                   <a:extLst>
                     <a:ext uri="{9D8B030D-6E8A-4147-A177-3AD203B41FA5}">
-                      <a16:colId xmlns="" xmlns:a16="http://schemas.microsoft.com/office/drawing/2014/main" val="20001"/>
+                      <a16:colId xmlns:a16="http://schemas.microsoft.com/office/drawing/2014/main" xmlns="" val="20001"/>
                     </a:ext>
                   </a:extLst>
                 </a:gridCol>
@@ -6103,7 +6103,7 @@
                 </a:tc>
                 <a:extLst>
                   <a:ext uri="{0D108BD9-81ED-4DB2-BD59-A6C34878D82A}">
-                    <a16:rowId xmlns="" xmlns:a16="http://schemas.microsoft.com/office/drawing/2014/main" val="10000"/>
+                    <a16:rowId xmlns:a16="http://schemas.microsoft.com/office/drawing/2014/main" xmlns="" val="10000"/>
                   </a:ext>
                 </a:extLst>
               </a:tr>
@@ -6289,7 +6289,7 @@
                 </a:tc>
                 <a:extLst>
                   <a:ext uri="{0D108BD9-81ED-4DB2-BD59-A6C34878D82A}">
-                    <a16:rowId xmlns="" xmlns:a16="http://schemas.microsoft.com/office/drawing/2014/main" val="10001"/>
+                    <a16:rowId xmlns:a16="http://schemas.microsoft.com/office/drawing/2014/main" xmlns="" val="10001"/>
                   </a:ext>
                 </a:extLst>
               </a:tr>
@@ -6475,7 +6475,7 @@
                 </a:tc>
                 <a:extLst>
                   <a:ext uri="{0D108BD9-81ED-4DB2-BD59-A6C34878D82A}">
-                    <a16:rowId xmlns="" xmlns:a16="http://schemas.microsoft.com/office/drawing/2014/main" val="10002"/>
+                    <a16:rowId xmlns:a16="http://schemas.microsoft.com/office/drawing/2014/main" xmlns="" val="10002"/>
                   </a:ext>
                 </a:extLst>
               </a:tr>
@@ -6653,7 +6653,7 @@
                 </a:tc>
                 <a:extLst>
                   <a:ext uri="{0D108BD9-81ED-4DB2-BD59-A6C34878D82A}">
-                    <a16:rowId xmlns="" xmlns:a16="http://schemas.microsoft.com/office/drawing/2014/main" val="10003"/>
+                    <a16:rowId xmlns:a16="http://schemas.microsoft.com/office/drawing/2014/main" xmlns="" val="10003"/>
                   </a:ext>
                 </a:extLst>
               </a:tr>
@@ -12471,21 +12471,21 @@
                 <a:gridCol w="2116477">
                   <a:extLst>
                     <a:ext uri="{9D8B030D-6E8A-4147-A177-3AD203B41FA5}">
-                      <a16:colId xmlns="" xmlns:a16="http://schemas.microsoft.com/office/drawing/2014/main" val="1511735896"/>
+                      <a16:colId xmlns:a16="http://schemas.microsoft.com/office/drawing/2014/main" xmlns="" val="1511735896"/>
                     </a:ext>
                   </a:extLst>
                 </a:gridCol>
                 <a:gridCol w="1715784">
                   <a:extLst>
                     <a:ext uri="{9D8B030D-6E8A-4147-A177-3AD203B41FA5}">
-                      <a16:colId xmlns="" xmlns:a16="http://schemas.microsoft.com/office/drawing/2014/main" val="2031167927"/>
+                      <a16:colId xmlns:a16="http://schemas.microsoft.com/office/drawing/2014/main" xmlns="" val="2031167927"/>
                     </a:ext>
                   </a:extLst>
                 </a:gridCol>
                 <a:gridCol w="2938409">
                   <a:extLst>
                     <a:ext uri="{9D8B030D-6E8A-4147-A177-3AD203B41FA5}">
-                      <a16:colId xmlns="" xmlns:a16="http://schemas.microsoft.com/office/drawing/2014/main" val="3629557874"/>
+                      <a16:colId xmlns:a16="http://schemas.microsoft.com/office/drawing/2014/main" xmlns="" val="3629557874"/>
                     </a:ext>
                   </a:extLst>
                 </a:gridCol>
@@ -12562,7 +12562,7 @@
                 </a:tc>
                 <a:extLst>
                   <a:ext uri="{0D108BD9-81ED-4DB2-BD59-A6C34878D82A}">
-                    <a16:rowId xmlns="" xmlns:a16="http://schemas.microsoft.com/office/drawing/2014/main" val="1243796099"/>
+                    <a16:rowId xmlns:a16="http://schemas.microsoft.com/office/drawing/2014/main" xmlns="" val="1243796099"/>
                   </a:ext>
                 </a:extLst>
               </a:tr>
@@ -12638,7 +12638,7 @@
                 </a:tc>
                 <a:extLst>
                   <a:ext uri="{0D108BD9-81ED-4DB2-BD59-A6C34878D82A}">
-                    <a16:rowId xmlns="" xmlns:a16="http://schemas.microsoft.com/office/drawing/2014/main" val="2157259634"/>
+                    <a16:rowId xmlns:a16="http://schemas.microsoft.com/office/drawing/2014/main" xmlns="" val="2157259634"/>
                   </a:ext>
                 </a:extLst>
               </a:tr>
@@ -13465,21 +13465,21 @@
                 <a:gridCol w="822947">
                   <a:extLst>
                     <a:ext uri="{9D8B030D-6E8A-4147-A177-3AD203B41FA5}">
-                      <a16:colId xmlns="" xmlns:a16="http://schemas.microsoft.com/office/drawing/2014/main" val="20000"/>
+                      <a16:colId xmlns:a16="http://schemas.microsoft.com/office/drawing/2014/main" xmlns="" val="20000"/>
                     </a:ext>
                   </a:extLst>
                 </a:gridCol>
                 <a:gridCol w="3116826">
                   <a:extLst>
                     <a:ext uri="{9D8B030D-6E8A-4147-A177-3AD203B41FA5}">
-                      <a16:colId xmlns="" xmlns:a16="http://schemas.microsoft.com/office/drawing/2014/main" val="20001"/>
+                      <a16:colId xmlns:a16="http://schemas.microsoft.com/office/drawing/2014/main" xmlns="" val="20001"/>
                     </a:ext>
                   </a:extLst>
                 </a:gridCol>
                 <a:gridCol w="5655164">
                   <a:extLst>
                     <a:ext uri="{9D8B030D-6E8A-4147-A177-3AD203B41FA5}">
-                      <a16:colId xmlns="" xmlns:a16="http://schemas.microsoft.com/office/drawing/2014/main" val="79684937"/>
+                      <a16:colId xmlns:a16="http://schemas.microsoft.com/office/drawing/2014/main" xmlns="" val="79684937"/>
                     </a:ext>
                   </a:extLst>
                 </a:gridCol>
@@ -13779,7 +13779,7 @@
                 </a:tc>
                 <a:extLst>
                   <a:ext uri="{0D108BD9-81ED-4DB2-BD59-A6C34878D82A}">
-                    <a16:rowId xmlns="" xmlns:a16="http://schemas.microsoft.com/office/drawing/2014/main" val="10000"/>
+                    <a16:rowId xmlns:a16="http://schemas.microsoft.com/office/drawing/2014/main" xmlns="" val="10000"/>
                   </a:ext>
                 </a:extLst>
               </a:tr>
@@ -14059,7 +14059,7 @@
                 </a:tc>
                 <a:extLst>
                   <a:ext uri="{0D108BD9-81ED-4DB2-BD59-A6C34878D82A}">
-                    <a16:rowId xmlns="" xmlns:a16="http://schemas.microsoft.com/office/drawing/2014/main" val="10001"/>
+                    <a16:rowId xmlns:a16="http://schemas.microsoft.com/office/drawing/2014/main" xmlns="" val="10001"/>
                   </a:ext>
                 </a:extLst>
               </a:tr>
@@ -14329,7 +14329,7 @@
                 </a:tc>
                 <a:extLst>
                   <a:ext uri="{0D108BD9-81ED-4DB2-BD59-A6C34878D82A}">
-                    <a16:rowId xmlns="" xmlns:a16="http://schemas.microsoft.com/office/drawing/2014/main" val="10002"/>
+                    <a16:rowId xmlns:a16="http://schemas.microsoft.com/office/drawing/2014/main" xmlns="" val="10002"/>
                   </a:ext>
                 </a:extLst>
               </a:tr>
@@ -14613,7 +14613,7 @@
                 </a:tc>
                 <a:extLst>
                   <a:ext uri="{0D108BD9-81ED-4DB2-BD59-A6C34878D82A}">
-                    <a16:rowId xmlns="" xmlns:a16="http://schemas.microsoft.com/office/drawing/2014/main" val="10003"/>
+                    <a16:rowId xmlns:a16="http://schemas.microsoft.com/office/drawing/2014/main" xmlns="" val="10003"/>
                   </a:ext>
                 </a:extLst>
               </a:tr>
@@ -18564,7 +18564,7 @@
   <a:extraClrSchemeLst/>
   <a:extLst>
     <a:ext uri="{05A4C25C-085E-4340-85A3-A5531E510DB2}">
-      <thm15:themeFamily xmlns="" xmlns:thm15="http://schemas.microsoft.com/office/thememl/2012/main" name="Ion Boardroom" id="{FC33163D-4339-46B1-8EED-24C834239D99}" vid="{A3AB87EF-B655-4FFF-8D05-F333AD7F2789}"/>
+      <thm15:themeFamily xmlns:thm15="http://schemas.microsoft.com/office/thememl/2012/main" name="Ion Boardroom" id="{FC33163D-4339-46B1-8EED-24C834239D99}" vid="{A3AB87EF-B655-4FFF-8D05-F333AD7F2789}"/>
     </a:ext>
   </a:extLst>
 </a:theme>
@@ -18825,7 +18825,7 @@
   <a:extraClrSchemeLst/>
   <a:extLst>
     <a:ext uri="{05A4C25C-085E-4340-85A3-A5531E510DB2}">
-      <thm15:themeFamily xmlns="" xmlns:thm15="http://schemas.microsoft.com/office/thememl/2012/main" name="Office Theme" id="{62F939B6-93AF-4DB8-9C6B-D6C7DFDC589F}" vid="{4A3C46E8-61CC-4603-A589-7422A47A8E4A}"/>
+      <thm15:themeFamily xmlns:thm15="http://schemas.microsoft.com/office/thememl/2012/main" name="Office Theme" id="{62F939B6-93AF-4DB8-9C6B-D6C7DFDC589F}" vid="{4A3C46E8-61CC-4603-A589-7422A47A8E4A}"/>
     </a:ext>
   </a:extLst>
 </a:theme>

</xml_diff>

<commit_message>
Update Protractor.pptx, inContact-v1.2.pptx, and inContact.pptx
</commit_message>
<xml_diff>
--- a/Document/Study_document/Protractor.pptx
+++ b/Document/Study_document/Protractor.pptx
@@ -242,7 +242,7 @@
           <a:p>
             <a:fld id="{7DBC1745-093B-4D3D-9A89-9CD99C9E4F7D}" type="datetimeFigureOut">
               <a:rPr lang="en-US" smtClean="0"/>
-              <a:t>2/22/2021</a:t>
+              <a:t>2/24/2021</a:t>
             </a:fld>
             <a:endParaRPr lang="en-US"/>
           </a:p>
@@ -1185,7 +1185,7 @@
           <a:p>
             <a:fld id="{AF88043E-905E-4148-B009-B3CB700EBBEA}" type="datetimeFigureOut">
               <a:rPr lang="en-US" smtClean="0"/>
-              <a:t>2/22/2021</a:t>
+              <a:t>2/24/2021</a:t>
             </a:fld>
             <a:endParaRPr lang="en-US"/>
           </a:p>
@@ -1571,7 +1571,7 @@
           <a:p>
             <a:fld id="{AF88043E-905E-4148-B009-B3CB700EBBEA}" type="datetimeFigureOut">
               <a:rPr lang="en-US" smtClean="0"/>
-              <a:t>2/22/2021</a:t>
+              <a:t>2/24/2021</a:t>
             </a:fld>
             <a:endParaRPr lang="en-US"/>
           </a:p>
@@ -1720,7 +1720,7 @@
           <a:p>
             <a:fld id="{AF88043E-905E-4148-B009-B3CB700EBBEA}" type="datetimeFigureOut">
               <a:rPr lang="en-US" smtClean="0"/>
-              <a:t>2/22/2021</a:t>
+              <a:t>2/24/2021</a:t>
             </a:fld>
             <a:endParaRPr lang="en-US"/>
           </a:p>
@@ -2361,7 +2361,7 @@
           <a:p>
             <a:fld id="{AF88043E-905E-4148-B009-B3CB700EBBEA}" type="datetimeFigureOut">
               <a:rPr lang="en-US" smtClean="0"/>
-              <a:t>2/22/2021</a:t>
+              <a:t>2/24/2021</a:t>
             </a:fld>
             <a:endParaRPr lang="en-US"/>
           </a:p>
@@ -3212,7 +3212,7 @@
           <a:p>
             <a:fld id="{AF88043E-905E-4148-B009-B3CB700EBBEA}" type="datetimeFigureOut">
               <a:rPr lang="en-US" smtClean="0"/>
-              <a:t>2/22/2021</a:t>
+              <a:t>2/24/2021</a:t>
             </a:fld>
             <a:endParaRPr lang="en-US"/>
           </a:p>
@@ -3391,7 +3391,7 @@
           <a:p>
             <a:fld id="{AF88043E-905E-4148-B009-B3CB700EBBEA}" type="datetimeFigureOut">
               <a:rPr lang="en-US" smtClean="0"/>
-              <a:t>2/22/2021</a:t>
+              <a:t>2/24/2021</a:t>
             </a:fld>
             <a:endParaRPr lang="en-US"/>
           </a:p>
@@ -4860,14 +4860,14 @@
                 <a:gridCol w="824770">
                   <a:extLst>
                     <a:ext uri="{9D8B030D-6E8A-4147-A177-3AD203B41FA5}">
-                      <a16:colId xmlns:a16="http://schemas.microsoft.com/office/drawing/2014/main" xmlns="" val="20000"/>
+                      <a16:colId xmlns="" xmlns:a16="http://schemas.microsoft.com/office/drawing/2014/main" val="20000"/>
                     </a:ext>
                   </a:extLst>
                 </a:gridCol>
                 <a:gridCol w="8770168">
                   <a:extLst>
                     <a:ext uri="{9D8B030D-6E8A-4147-A177-3AD203B41FA5}">
-                      <a16:colId xmlns:a16="http://schemas.microsoft.com/office/drawing/2014/main" xmlns="" val="20001"/>
+                      <a16:colId xmlns="" xmlns:a16="http://schemas.microsoft.com/office/drawing/2014/main" val="20001"/>
                     </a:ext>
                   </a:extLst>
                 </a:gridCol>
@@ -5072,7 +5072,7 @@
                 </a:tc>
                 <a:extLst>
                   <a:ext uri="{0D108BD9-81ED-4DB2-BD59-A6C34878D82A}">
-                    <a16:rowId xmlns:a16="http://schemas.microsoft.com/office/drawing/2014/main" xmlns="" val="10000"/>
+                    <a16:rowId xmlns="" xmlns:a16="http://schemas.microsoft.com/office/drawing/2014/main" val="10000"/>
                   </a:ext>
                 </a:extLst>
               </a:tr>
@@ -5300,7 +5300,7 @@
                 </a:tc>
                 <a:extLst>
                   <a:ext uri="{0D108BD9-81ED-4DB2-BD59-A6C34878D82A}">
-                    <a16:rowId xmlns:a16="http://schemas.microsoft.com/office/drawing/2014/main" xmlns="" val="10001"/>
+                    <a16:rowId xmlns="" xmlns:a16="http://schemas.microsoft.com/office/drawing/2014/main" val="10001"/>
                   </a:ext>
                 </a:extLst>
               </a:tr>
@@ -5500,7 +5500,7 @@
                 </a:tc>
                 <a:extLst>
                   <a:ext uri="{0D108BD9-81ED-4DB2-BD59-A6C34878D82A}">
-                    <a16:rowId xmlns:a16="http://schemas.microsoft.com/office/drawing/2014/main" xmlns="" val="10002"/>
+                    <a16:rowId xmlns="" xmlns:a16="http://schemas.microsoft.com/office/drawing/2014/main" val="10002"/>
                   </a:ext>
                 </a:extLst>
               </a:tr>
@@ -5692,7 +5692,7 @@
                 </a:tc>
                 <a:extLst>
                   <a:ext uri="{0D108BD9-81ED-4DB2-BD59-A6C34878D82A}">
-                    <a16:rowId xmlns:a16="http://schemas.microsoft.com/office/drawing/2014/main" xmlns="" val="10003"/>
+                    <a16:rowId xmlns="" xmlns:a16="http://schemas.microsoft.com/office/drawing/2014/main" val="10003"/>
                   </a:ext>
                 </a:extLst>
               </a:tr>
@@ -5919,14 +5919,14 @@
                 <a:gridCol w="824770">
                   <a:extLst>
                     <a:ext uri="{9D8B030D-6E8A-4147-A177-3AD203B41FA5}">
-                      <a16:colId xmlns:a16="http://schemas.microsoft.com/office/drawing/2014/main" xmlns="" val="20000"/>
+                      <a16:colId xmlns="" xmlns:a16="http://schemas.microsoft.com/office/drawing/2014/main" val="20000"/>
                     </a:ext>
                   </a:extLst>
                 </a:gridCol>
                 <a:gridCol w="8770168">
                   <a:extLst>
                     <a:ext uri="{9D8B030D-6E8A-4147-A177-3AD203B41FA5}">
-                      <a16:colId xmlns:a16="http://schemas.microsoft.com/office/drawing/2014/main" xmlns="" val="20001"/>
+                      <a16:colId xmlns="" xmlns:a16="http://schemas.microsoft.com/office/drawing/2014/main" val="20001"/>
                     </a:ext>
                   </a:extLst>
                 </a:gridCol>
@@ -6103,7 +6103,7 @@
                 </a:tc>
                 <a:extLst>
                   <a:ext uri="{0D108BD9-81ED-4DB2-BD59-A6C34878D82A}">
-                    <a16:rowId xmlns:a16="http://schemas.microsoft.com/office/drawing/2014/main" xmlns="" val="10000"/>
+                    <a16:rowId xmlns="" xmlns:a16="http://schemas.microsoft.com/office/drawing/2014/main" val="10000"/>
                   </a:ext>
                 </a:extLst>
               </a:tr>
@@ -6289,7 +6289,7 @@
                 </a:tc>
                 <a:extLst>
                   <a:ext uri="{0D108BD9-81ED-4DB2-BD59-A6C34878D82A}">
-                    <a16:rowId xmlns:a16="http://schemas.microsoft.com/office/drawing/2014/main" xmlns="" val="10001"/>
+                    <a16:rowId xmlns="" xmlns:a16="http://schemas.microsoft.com/office/drawing/2014/main" val="10001"/>
                   </a:ext>
                 </a:extLst>
               </a:tr>
@@ -6475,7 +6475,7 @@
                 </a:tc>
                 <a:extLst>
                   <a:ext uri="{0D108BD9-81ED-4DB2-BD59-A6C34878D82A}">
-                    <a16:rowId xmlns:a16="http://schemas.microsoft.com/office/drawing/2014/main" xmlns="" val="10002"/>
+                    <a16:rowId xmlns="" xmlns:a16="http://schemas.microsoft.com/office/drawing/2014/main" val="10002"/>
                   </a:ext>
                 </a:extLst>
               </a:tr>
@@ -6653,7 +6653,7 @@
                 </a:tc>
                 <a:extLst>
                   <a:ext uri="{0D108BD9-81ED-4DB2-BD59-A6C34878D82A}">
-                    <a16:rowId xmlns:a16="http://schemas.microsoft.com/office/drawing/2014/main" xmlns="" val="10003"/>
+                    <a16:rowId xmlns="" xmlns:a16="http://schemas.microsoft.com/office/drawing/2014/main" val="10003"/>
                   </a:ext>
                 </a:extLst>
               </a:tr>
@@ -12471,21 +12471,21 @@
                 <a:gridCol w="2116477">
                   <a:extLst>
                     <a:ext uri="{9D8B030D-6E8A-4147-A177-3AD203B41FA5}">
-                      <a16:colId xmlns:a16="http://schemas.microsoft.com/office/drawing/2014/main" xmlns="" val="1511735896"/>
+                      <a16:colId xmlns="" xmlns:a16="http://schemas.microsoft.com/office/drawing/2014/main" val="1511735896"/>
                     </a:ext>
                   </a:extLst>
                 </a:gridCol>
                 <a:gridCol w="1715784">
                   <a:extLst>
                     <a:ext uri="{9D8B030D-6E8A-4147-A177-3AD203B41FA5}">
-                      <a16:colId xmlns:a16="http://schemas.microsoft.com/office/drawing/2014/main" xmlns="" val="2031167927"/>
+                      <a16:colId xmlns="" xmlns:a16="http://schemas.microsoft.com/office/drawing/2014/main" val="2031167927"/>
                     </a:ext>
                   </a:extLst>
                 </a:gridCol>
                 <a:gridCol w="2938409">
                   <a:extLst>
                     <a:ext uri="{9D8B030D-6E8A-4147-A177-3AD203B41FA5}">
-                      <a16:colId xmlns:a16="http://schemas.microsoft.com/office/drawing/2014/main" xmlns="" val="3629557874"/>
+                      <a16:colId xmlns="" xmlns:a16="http://schemas.microsoft.com/office/drawing/2014/main" val="3629557874"/>
                     </a:ext>
                   </a:extLst>
                 </a:gridCol>
@@ -12562,7 +12562,7 @@
                 </a:tc>
                 <a:extLst>
                   <a:ext uri="{0D108BD9-81ED-4DB2-BD59-A6C34878D82A}">
-                    <a16:rowId xmlns:a16="http://schemas.microsoft.com/office/drawing/2014/main" xmlns="" val="1243796099"/>
+                    <a16:rowId xmlns="" xmlns:a16="http://schemas.microsoft.com/office/drawing/2014/main" val="1243796099"/>
                   </a:ext>
                 </a:extLst>
               </a:tr>
@@ -12638,7 +12638,7 @@
                 </a:tc>
                 <a:extLst>
                   <a:ext uri="{0D108BD9-81ED-4DB2-BD59-A6C34878D82A}">
-                    <a16:rowId xmlns:a16="http://schemas.microsoft.com/office/drawing/2014/main" xmlns="" val="2157259634"/>
+                    <a16:rowId xmlns="" xmlns:a16="http://schemas.microsoft.com/office/drawing/2014/main" val="2157259634"/>
                   </a:ext>
                 </a:extLst>
               </a:tr>
@@ -13465,21 +13465,21 @@
                 <a:gridCol w="822947">
                   <a:extLst>
                     <a:ext uri="{9D8B030D-6E8A-4147-A177-3AD203B41FA5}">
-                      <a16:colId xmlns:a16="http://schemas.microsoft.com/office/drawing/2014/main" xmlns="" val="20000"/>
+                      <a16:colId xmlns="" xmlns:a16="http://schemas.microsoft.com/office/drawing/2014/main" val="20000"/>
                     </a:ext>
                   </a:extLst>
                 </a:gridCol>
                 <a:gridCol w="3116826">
                   <a:extLst>
                     <a:ext uri="{9D8B030D-6E8A-4147-A177-3AD203B41FA5}">
-                      <a16:colId xmlns:a16="http://schemas.microsoft.com/office/drawing/2014/main" xmlns="" val="20001"/>
+                      <a16:colId xmlns="" xmlns:a16="http://schemas.microsoft.com/office/drawing/2014/main" val="20001"/>
                     </a:ext>
                   </a:extLst>
                 </a:gridCol>
                 <a:gridCol w="5655164">
                   <a:extLst>
                     <a:ext uri="{9D8B030D-6E8A-4147-A177-3AD203B41FA5}">
-                      <a16:colId xmlns:a16="http://schemas.microsoft.com/office/drawing/2014/main" xmlns="" val="79684937"/>
+                      <a16:colId xmlns="" xmlns:a16="http://schemas.microsoft.com/office/drawing/2014/main" val="79684937"/>
                     </a:ext>
                   </a:extLst>
                 </a:gridCol>
@@ -13779,7 +13779,7 @@
                 </a:tc>
                 <a:extLst>
                   <a:ext uri="{0D108BD9-81ED-4DB2-BD59-A6C34878D82A}">
-                    <a16:rowId xmlns:a16="http://schemas.microsoft.com/office/drawing/2014/main" xmlns="" val="10000"/>
+                    <a16:rowId xmlns="" xmlns:a16="http://schemas.microsoft.com/office/drawing/2014/main" val="10000"/>
                   </a:ext>
                 </a:extLst>
               </a:tr>
@@ -14059,7 +14059,7 @@
                 </a:tc>
                 <a:extLst>
                   <a:ext uri="{0D108BD9-81ED-4DB2-BD59-A6C34878D82A}">
-                    <a16:rowId xmlns:a16="http://schemas.microsoft.com/office/drawing/2014/main" xmlns="" val="10001"/>
+                    <a16:rowId xmlns="" xmlns:a16="http://schemas.microsoft.com/office/drawing/2014/main" val="10001"/>
                   </a:ext>
                 </a:extLst>
               </a:tr>
@@ -14329,7 +14329,7 @@
                 </a:tc>
                 <a:extLst>
                   <a:ext uri="{0D108BD9-81ED-4DB2-BD59-A6C34878D82A}">
-                    <a16:rowId xmlns:a16="http://schemas.microsoft.com/office/drawing/2014/main" xmlns="" val="10002"/>
+                    <a16:rowId xmlns="" xmlns:a16="http://schemas.microsoft.com/office/drawing/2014/main" val="10002"/>
                   </a:ext>
                 </a:extLst>
               </a:tr>
@@ -14613,7 +14613,7 @@
                 </a:tc>
                 <a:extLst>
                   <a:ext uri="{0D108BD9-81ED-4DB2-BD59-A6C34878D82A}">
-                    <a16:rowId xmlns:a16="http://schemas.microsoft.com/office/drawing/2014/main" xmlns="" val="10003"/>
+                    <a16:rowId xmlns="" xmlns:a16="http://schemas.microsoft.com/office/drawing/2014/main" val="10003"/>
                   </a:ext>
                 </a:extLst>
               </a:tr>

</xml_diff>